<commit_message>
BX Bài tập bài 18,19
</commit_message>
<xml_diff>
--- a/Bai 18 Chia cum van ban_p1.pptx
+++ b/Bai 18 Chia cum van ban_p1.pptx
@@ -5,7 +5,7 @@
     <p:sldMasterId id="2147483652" r:id="rId1"/>
   </p:sldMasterIdLst>
   <p:notesMasterIdLst>
-    <p:notesMasterId r:id="rId46"/>
+    <p:notesMasterId r:id="rId47"/>
   </p:notesMasterIdLst>
   <p:sldIdLst>
     <p:sldId id="313" r:id="rId2"/>
@@ -51,7 +51,8 @@
     <p:sldId id="525" r:id="rId42"/>
     <p:sldId id="526" r:id="rId43"/>
     <p:sldId id="544" r:id="rId44"/>
-    <p:sldId id="418" r:id="rId45"/>
+    <p:sldId id="548" r:id="rId45"/>
+    <p:sldId id="418" r:id="rId46"/>
   </p:sldIdLst>
   <p:sldSz cx="9144000" cy="6858000" type="screen4x3"/>
   <p:notesSz cx="6858000" cy="9144000"/>
@@ -11708,7 +11709,7 @@
           <p:nvPr/>
         </p:nvPicPr>
         <p:blipFill>
-          <a:blip r:embed="rId3"/>
+          <a:blip/>
           <a:srcRect/>
           <a:stretch>
             <a:fillRect/>
@@ -16318,11 +16319,7 @@
             <a:pPr eaLnBrk="1" hangingPunct="1"/>
             <a:r>
               <a:rPr lang="en-US" sz="3600" smtClean="0"/>
-              <a:t>Bài </a:t>
-            </a:r>
-            <a:r>
-              <a:rPr lang="en-US" sz="3600" smtClean="0"/>
-              <a:t>tập 18.1</a:t>
+              <a:t>Bài tập 18.1</a:t>
             </a:r>
             <a:endParaRPr lang="vi-VN" sz="3600" dirty="0" smtClean="0"/>
           </a:p>
@@ -16409,6 +16406,138 @@
 </file>
 
 <file path=ppt/slides/slide44.xml><?xml version="1.0" encoding="utf-8"?>
+<p:sld xmlns:a="http://schemas.openxmlformats.org/drawingml/2006/main" xmlns:r="http://schemas.openxmlformats.org/officeDocument/2006/relationships" xmlns:p="http://schemas.openxmlformats.org/presentationml/2006/main">
+  <p:cSld>
+    <p:spTree>
+      <p:nvGrpSpPr>
+        <p:cNvPr id="1" name=""/>
+        <p:cNvGrpSpPr/>
+        <p:nvPr/>
+      </p:nvGrpSpPr>
+      <p:grpSpPr>
+        <a:xfrm>
+          <a:off x="0" y="0"/>
+          <a:ext cx="0" cy="0"/>
+          <a:chOff x="0" y="0"/>
+          <a:chExt cx="0" cy="0"/>
+        </a:xfrm>
+      </p:grpSpPr>
+      <p:sp>
+        <p:nvSpPr>
+          <p:cNvPr id="6146" name="Rectangle 2"/>
+          <p:cNvSpPr>
+            <a:spLocks noGrp="1" noChangeArrowheads="1"/>
+          </p:cNvSpPr>
+          <p:nvPr>
+            <p:ph type="title"/>
+          </p:nvPr>
+        </p:nvSpPr>
+        <p:spPr/>
+        <p:txBody>
+          <a:bodyPr/>
+          <a:lstStyle/>
+          <a:p>
+            <a:pPr eaLnBrk="1" hangingPunct="1"/>
+            <a:r>
+              <a:rPr lang="en-US" sz="3600" smtClean="0"/>
+              <a:t>Bài tập 18.2</a:t>
+            </a:r>
+            <a:endParaRPr lang="vi-VN" sz="3600" dirty="0" smtClean="0"/>
+          </a:p>
+        </p:txBody>
+      </p:sp>
+      <p:sp>
+        <p:nvSpPr>
+          <p:cNvPr id="6147" name="Rectangle 3"/>
+          <p:cNvSpPr>
+            <a:spLocks noGrp="1" noChangeArrowheads="1"/>
+          </p:cNvSpPr>
+          <p:nvPr>
+            <p:ph type="body" idx="1"/>
+          </p:nvPr>
+        </p:nvSpPr>
+        <p:spPr>
+          <a:xfrm>
+            <a:off x="611560" y="1916832"/>
+            <a:ext cx="8343528" cy="3888432"/>
+          </a:xfrm>
+        </p:spPr>
+        <p:txBody>
+          <a:bodyPr/>
+          <a:lstStyle/>
+          <a:p>
+            <a:pPr marL="0" indent="0" algn="just" eaLnBrk="1" hangingPunct="1">
+              <a:buNone/>
+              <a:defRPr/>
+            </a:pPr>
+            <a:r>
+              <a:rPr lang="en-US" noProof="1" smtClean="0"/>
+              <a:t>Hãy lấy một ví dụ đơn giản trên không gian một chiều (điểm trên trục số) để minh họa cho trường hợp kém hiệu quả của phương pháp tìm kiếm trên cơ sở chia cụm.</a:t>
+            </a:r>
+          </a:p>
+          <a:p>
+            <a:pPr marL="0" indent="0" algn="just" eaLnBrk="1" hangingPunct="1">
+              <a:buNone/>
+              <a:defRPr/>
+            </a:pPr>
+            <a:r>
+              <a:rPr lang="en-US" noProof="1" smtClean="0"/>
+              <a:t>Trong ví dụ, kết quả tìm kiếm trong cụm gần với câu truy vấn phải kém hơn kết quả tìm kiếm những láng giềng gần nhất.</a:t>
+            </a:r>
+            <a:endParaRPr lang="en-US" noProof="1"/>
+          </a:p>
+        </p:txBody>
+      </p:sp>
+      <p:sp>
+        <p:nvSpPr>
+          <p:cNvPr id="2" name="Slide Number Placeholder 1"/>
+          <p:cNvSpPr>
+            <a:spLocks noGrp="1"/>
+          </p:cNvSpPr>
+          <p:nvPr>
+            <p:ph type="sldNum" sz="quarter" idx="12"/>
+          </p:nvPr>
+        </p:nvSpPr>
+        <p:spPr/>
+        <p:txBody>
+          <a:bodyPr/>
+          <a:lstStyle/>
+          <a:p>
+            <a:pPr>
+              <a:defRPr/>
+            </a:pPr>
+            <a:fld id="{A81E07A1-38DA-436E-9EB2-1E501CB9FFA7}" type="slidenum">
+              <a:rPr lang="vi-VN" smtClean="0"/>
+              <a:pPr>
+                <a:defRPr/>
+              </a:pPr>
+              <a:t>44</a:t>
+            </a:fld>
+            <a:endParaRPr lang="vi-VN"/>
+          </a:p>
+        </p:txBody>
+      </p:sp>
+    </p:spTree>
+    <p:extLst>
+      <p:ext uri="{BB962C8B-B14F-4D97-AF65-F5344CB8AC3E}">
+        <p14:creationId xmlns:p14="http://schemas.microsoft.com/office/powerpoint/2010/main" val="2630263354"/>
+      </p:ext>
+    </p:extLst>
+  </p:cSld>
+  <p:clrMapOvr>
+    <a:masterClrMapping/>
+  </p:clrMapOvr>
+  <p:timing>
+    <p:tnLst>
+      <p:par>
+        <p:cTn id="1" dur="indefinite" restart="never" nodeType="tmRoot"/>
+      </p:par>
+    </p:tnLst>
+  </p:timing>
+</p:sld>
+</file>
+
+<file path=ppt/slides/slide45.xml><?xml version="1.0" encoding="utf-8"?>
 <p:sld xmlns:a="http://schemas.openxmlformats.org/drawingml/2006/main" xmlns:r="http://schemas.openxmlformats.org/officeDocument/2006/relationships" xmlns:p="http://schemas.openxmlformats.org/presentationml/2006/main">
   <p:cSld>
     <p:spTree>
@@ -16522,7 +16651,7 @@
               <a:pPr>
                 <a:defRPr/>
               </a:pPr>
-              <a:t>44</a:t>
+              <a:t>45</a:t>
             </a:fld>
             <a:endParaRPr lang="vi-VN"/>
           </a:p>

</xml_diff>